<commit_message>
updated via upload on 23 march 2021
</commit_message>
<xml_diff>
--- a/docs/images/instalment/Instalment Purchases.pptx
+++ b/docs/images/instalment/Instalment Purchases.pptx
@@ -126,6 +126,11 @@
       </a:defRPr>
     </a:lvl9pPr>
   </p:defaultTextStyle>
+  <p:extLst>
+    <p:ext uri="{EFAFB233-063F-42B5-8137-9DF3F51BA10A}">
+      <p15:sldGuideLst xmlns:p15="http://schemas.microsoft.com/office/powerpoint/2012/main"/>
+    </p:ext>
+  </p:extLst>
 </p:presentation>
 </file>
 
@@ -211,7 +216,7 @@
           <a:p>
             <a:fld id="{4520374D-A10D-4F16-A346-D54563820891}" type="datetimeFigureOut">
               <a:rPr lang="en-MY" smtClean="0"/>
-              <a:t>3/4/2020</a:t>
+              <a:t>8/12/2020</a:t>
             </a:fld>
             <a:endParaRPr lang="en-MY"/>
           </a:p>
@@ -730,7 +735,7 @@
           <a:p>
             <a:fld id="{48A87A34-81AB-432B-8DAE-1953F412C126}" type="datetimeFigureOut">
               <a:rPr lang="en-US" dirty="0"/>
-              <a:t>4/3/2020</a:t>
+              <a:t>12/8/2020</a:t>
             </a:fld>
             <a:endParaRPr lang="en-US" dirty="0"/>
           </a:p>
@@ -992,7 +997,7 @@
           <a:p>
             <a:fld id="{48A87A34-81AB-432B-8DAE-1953F412C126}" type="datetimeFigureOut">
               <a:rPr lang="en-US" dirty="0"/>
-              <a:t>4/3/2020</a:t>
+              <a:t>12/8/2020</a:t>
             </a:fld>
             <a:endParaRPr lang="en-US" dirty="0"/>
           </a:p>
@@ -1219,7 +1224,7 @@
             <a:fld id="{48A87A34-81AB-432B-8DAE-1953F412C126}" type="datetimeFigureOut">
               <a:rPr lang="en-US" dirty="0"/>
               <a:pPr/>
-              <a:t>4/3/2020</a:t>
+              <a:t>12/8/2020</a:t>
             </a:fld>
             <a:endParaRPr lang="en-US" dirty="0"/>
           </a:p>
@@ -1525,7 +1530,7 @@
             <a:fld id="{48A87A34-81AB-432B-8DAE-1953F412C126}" type="datetimeFigureOut">
               <a:rPr lang="en-US" dirty="0"/>
               <a:pPr/>
-              <a:t>4/3/2020</a:t>
+              <a:t>12/8/2020</a:t>
             </a:fld>
             <a:endParaRPr lang="en-US" dirty="0"/>
           </a:p>
@@ -1994,7 +1999,7 @@
             <a:fld id="{48A87A34-81AB-432B-8DAE-1953F412C126}" type="datetimeFigureOut">
               <a:rPr lang="en-US" dirty="0"/>
               <a:pPr/>
-              <a:t>4/3/2020</a:t>
+              <a:t>12/8/2020</a:t>
             </a:fld>
             <a:endParaRPr lang="en-US" dirty="0"/>
           </a:p>
@@ -2536,7 +2541,7 @@
           <a:p>
             <a:fld id="{48A87A34-81AB-432B-8DAE-1953F412C126}" type="datetimeFigureOut">
               <a:rPr lang="en-US" dirty="0"/>
-              <a:t>4/3/2020</a:t>
+              <a:t>12/8/2020</a:t>
             </a:fld>
             <a:endParaRPr lang="en-US" dirty="0"/>
           </a:p>
@@ -3305,7 +3310,7 @@
           <a:p>
             <a:fld id="{48A87A34-81AB-432B-8DAE-1953F412C126}" type="datetimeFigureOut">
               <a:rPr lang="en-US" dirty="0"/>
-              <a:t>4/3/2020</a:t>
+              <a:t>12/8/2020</a:t>
             </a:fld>
             <a:endParaRPr lang="en-US" dirty="0"/>
           </a:p>
@@ -3475,7 +3480,7 @@
           <a:p>
             <a:fld id="{48A87A34-81AB-432B-8DAE-1953F412C126}" type="datetimeFigureOut">
               <a:rPr lang="en-US" dirty="0"/>
-              <a:t>4/3/2020</a:t>
+              <a:t>12/8/2020</a:t>
             </a:fld>
             <a:endParaRPr lang="en-US" dirty="0"/>
           </a:p>
@@ -3694,7 +3699,7 @@
             <a:fld id="{48A87A34-81AB-432B-8DAE-1953F412C126}" type="datetimeFigureOut">
               <a:rPr lang="en-US" dirty="0"/>
               <a:pPr/>
-              <a:t>4/3/2020</a:t>
+              <a:t>12/8/2020</a:t>
             </a:fld>
             <a:endParaRPr lang="en-US" dirty="0"/>
           </a:p>
@@ -3930,7 +3935,7 @@
           <a:p>
             <a:fld id="{48A87A34-81AB-432B-8DAE-1953F412C126}" type="datetimeFigureOut">
               <a:rPr lang="en-US" smtClean="0"/>
-              <a:t>4/3/2020</a:t>
+              <a:t>12/8/2020</a:t>
             </a:fld>
             <a:endParaRPr lang="en-US" dirty="0"/>
           </a:p>
@@ -4110,7 +4115,7 @@
           <a:p>
             <a:fld id="{48A87A34-81AB-432B-8DAE-1953F412C126}" type="datetimeFigureOut">
               <a:rPr lang="en-US" smtClean="0"/>
-              <a:t>4/3/2020</a:t>
+              <a:t>12/8/2020</a:t>
             </a:fld>
             <a:endParaRPr lang="en-US" dirty="0"/>
           </a:p>
@@ -4280,7 +4285,7 @@
           <a:p>
             <a:fld id="{48A87A34-81AB-432B-8DAE-1953F412C126}" type="datetimeFigureOut">
               <a:rPr lang="en-US" dirty="0"/>
-              <a:t>4/3/2020</a:t>
+              <a:t>12/8/2020</a:t>
             </a:fld>
             <a:endParaRPr lang="en-US" dirty="0"/>
           </a:p>
@@ -4565,7 +4570,7 @@
             <a:fld id="{48A87A34-81AB-432B-8DAE-1953F412C126}" type="datetimeFigureOut">
               <a:rPr lang="en-US" smtClean="0"/>
               <a:pPr/>
-              <a:t>4/3/2020</a:t>
+              <a:t>12/8/2020</a:t>
             </a:fld>
             <a:endParaRPr lang="en-US" dirty="0"/>
           </a:p>
@@ -4807,7 +4812,7 @@
           <a:p>
             <a:fld id="{48A87A34-81AB-432B-8DAE-1953F412C126}" type="datetimeFigureOut">
               <a:rPr lang="en-US" smtClean="0"/>
-              <a:t>4/3/2020</a:t>
+              <a:t>12/8/2020</a:t>
             </a:fld>
             <a:endParaRPr lang="en-US" dirty="0"/>
           </a:p>
@@ -5186,7 +5191,7 @@
           <a:p>
             <a:fld id="{48A87A34-81AB-432B-8DAE-1953F412C126}" type="datetimeFigureOut">
               <a:rPr lang="en-US" smtClean="0"/>
-              <a:t>4/3/2020</a:t>
+              <a:t>12/8/2020</a:t>
             </a:fld>
             <a:endParaRPr lang="en-US" dirty="0"/>
           </a:p>
@@ -5304,7 +5309,7 @@
           <a:p>
             <a:fld id="{48A87A34-81AB-432B-8DAE-1953F412C126}" type="datetimeFigureOut">
               <a:rPr lang="en-US" smtClean="0"/>
-              <a:t>4/3/2020</a:t>
+              <a:t>12/8/2020</a:t>
             </a:fld>
             <a:endParaRPr lang="en-US" dirty="0"/>
           </a:p>
@@ -5399,7 +5404,7 @@
           <a:p>
             <a:fld id="{48A87A34-81AB-432B-8DAE-1953F412C126}" type="datetimeFigureOut">
               <a:rPr lang="en-US" smtClean="0"/>
-              <a:t>4/3/2020</a:t>
+              <a:t>12/8/2020</a:t>
             </a:fld>
             <a:endParaRPr lang="en-US" dirty="0"/>
           </a:p>
@@ -5648,7 +5653,7 @@
           <a:p>
             <a:fld id="{48A87A34-81AB-432B-8DAE-1953F412C126}" type="datetimeFigureOut">
               <a:rPr lang="en-US" smtClean="0"/>
-              <a:t>4/3/2020</a:t>
+              <a:t>12/8/2020</a:t>
             </a:fld>
             <a:endParaRPr lang="en-US" dirty="0"/>
           </a:p>
@@ -5905,7 +5910,7 @@
           <a:p>
             <a:fld id="{48A87A34-81AB-432B-8DAE-1953F412C126}" type="datetimeFigureOut">
               <a:rPr lang="en-US" smtClean="0"/>
-              <a:t>4/3/2020</a:t>
+              <a:t>12/8/2020</a:t>
             </a:fld>
             <a:endParaRPr lang="en-US" dirty="0"/>
           </a:p>
@@ -6162,7 +6167,7 @@
           <a:p>
             <a:fld id="{48A87A34-81AB-432B-8DAE-1953F412C126}" type="datetimeFigureOut">
               <a:rPr lang="en-US" smtClean="0"/>
-              <a:t>4/3/2020</a:t>
+              <a:t>12/8/2020</a:t>
             </a:fld>
             <a:endParaRPr lang="en-US" dirty="0"/>
           </a:p>
@@ -6394,7 +6399,7 @@
             <a:fld id="{48A87A34-81AB-432B-8DAE-1953F412C126}" type="datetimeFigureOut">
               <a:rPr lang="en-US" smtClean="0"/>
               <a:pPr/>
-              <a:t>4/3/2020</a:t>
+              <a:t>12/8/2020</a:t>
             </a:fld>
             <a:endParaRPr lang="en-US" dirty="0"/>
           </a:p>
@@ -6705,7 +6710,7 @@
             <a:fld id="{48A87A34-81AB-432B-8DAE-1953F412C126}" type="datetimeFigureOut">
               <a:rPr lang="en-US" smtClean="0"/>
               <a:pPr/>
-              <a:t>4/3/2020</a:t>
+              <a:t>12/8/2020</a:t>
             </a:fld>
             <a:endParaRPr lang="en-US" dirty="0"/>
           </a:p>
@@ -7237,7 +7242,7 @@
             <a:fld id="{48A87A34-81AB-432B-8DAE-1953F412C126}" type="datetimeFigureOut">
               <a:rPr lang="en-US" dirty="0"/>
               <a:pPr/>
-              <a:t>4/3/2020</a:t>
+              <a:t>12/8/2020</a:t>
             </a:fld>
             <a:endParaRPr lang="en-US" dirty="0"/>
           </a:p>
@@ -7474,7 +7479,7 @@
             <a:fld id="{48A87A34-81AB-432B-8DAE-1953F412C126}" type="datetimeFigureOut">
               <a:rPr lang="en-US" smtClean="0"/>
               <a:pPr/>
-              <a:t>4/3/2020</a:t>
+              <a:t>12/8/2020</a:t>
             </a:fld>
             <a:endParaRPr lang="en-US" dirty="0"/>
           </a:p>
@@ -8021,7 +8026,7 @@
           <a:p>
             <a:fld id="{48A87A34-81AB-432B-8DAE-1953F412C126}" type="datetimeFigureOut">
               <a:rPr lang="en-US" smtClean="0"/>
-              <a:t>4/3/2020</a:t>
+              <a:t>12/8/2020</a:t>
             </a:fld>
             <a:endParaRPr lang="en-US" dirty="0"/>
           </a:p>
@@ -8795,7 +8800,7 @@
           <a:p>
             <a:fld id="{48A87A34-81AB-432B-8DAE-1953F412C126}" type="datetimeFigureOut">
               <a:rPr lang="en-US" smtClean="0"/>
-              <a:t>4/3/2020</a:t>
+              <a:t>12/8/2020</a:t>
             </a:fld>
             <a:endParaRPr lang="en-US" dirty="0"/>
           </a:p>
@@ -8970,7 +8975,7 @@
           <a:p>
             <a:fld id="{48A87A34-81AB-432B-8DAE-1953F412C126}" type="datetimeFigureOut">
               <a:rPr lang="en-US" smtClean="0"/>
-              <a:t>4/3/2020</a:t>
+              <a:t>12/8/2020</a:t>
             </a:fld>
             <a:endParaRPr lang="en-US" dirty="0"/>
           </a:p>
@@ -9194,7 +9199,7 @@
             <a:fld id="{48A87A34-81AB-432B-8DAE-1953F412C126}" type="datetimeFigureOut">
               <a:rPr lang="en-US" smtClean="0"/>
               <a:pPr/>
-              <a:t>4/3/2020</a:t>
+              <a:t>12/8/2020</a:t>
             </a:fld>
             <a:endParaRPr lang="en-US" dirty="0"/>
           </a:p>
@@ -9436,7 +9441,7 @@
           <a:p>
             <a:fld id="{48A87A34-81AB-432B-8DAE-1953F412C126}" type="datetimeFigureOut">
               <a:rPr lang="en-US" dirty="0"/>
-              <a:t>4/3/2020</a:t>
+              <a:t>12/8/2020</a:t>
             </a:fld>
             <a:endParaRPr lang="en-US" dirty="0"/>
           </a:p>
@@ -9810,7 +9815,7 @@
           <a:p>
             <a:fld id="{48A87A34-81AB-432B-8DAE-1953F412C126}" type="datetimeFigureOut">
               <a:rPr lang="en-US" dirty="0"/>
-              <a:t>4/3/2020</a:t>
+              <a:t>12/8/2020</a:t>
             </a:fld>
             <a:endParaRPr lang="en-US" dirty="0"/>
           </a:p>
@@ -9923,7 +9928,7 @@
           <a:p>
             <a:fld id="{48A87A34-81AB-432B-8DAE-1953F412C126}" type="datetimeFigureOut">
               <a:rPr lang="en-US" dirty="0"/>
-              <a:t>4/3/2020</a:t>
+              <a:t>12/8/2020</a:t>
             </a:fld>
             <a:endParaRPr lang="en-US" dirty="0"/>
           </a:p>
@@ -10013,7 +10018,7 @@
           <a:p>
             <a:fld id="{48A87A34-81AB-432B-8DAE-1953F412C126}" type="datetimeFigureOut">
               <a:rPr lang="en-US" dirty="0"/>
-              <a:t>4/3/2020</a:t>
+              <a:t>12/8/2020</a:t>
             </a:fld>
             <a:endParaRPr lang="en-US" dirty="0"/>
           </a:p>
@@ -10257,7 +10262,7 @@
           <a:p>
             <a:fld id="{48A87A34-81AB-432B-8DAE-1953F412C126}" type="datetimeFigureOut">
               <a:rPr lang="en-US" dirty="0"/>
-              <a:t>4/3/2020</a:t>
+              <a:t>12/8/2020</a:t>
             </a:fld>
             <a:endParaRPr lang="en-US" dirty="0"/>
           </a:p>
@@ -10509,7 +10514,7 @@
           <a:p>
             <a:fld id="{48A87A34-81AB-432B-8DAE-1953F412C126}" type="datetimeFigureOut">
               <a:rPr lang="en-US" dirty="0"/>
-              <a:t>4/3/2020</a:t>
+              <a:t>12/8/2020</a:t>
             </a:fld>
             <a:endParaRPr lang="en-US" dirty="0"/>
           </a:p>
@@ -10748,7 +10753,7 @@
             <a:fld id="{48A87A34-81AB-432B-8DAE-1953F412C126}" type="datetimeFigureOut">
               <a:rPr lang="en-US" dirty="0"/>
               <a:pPr/>
-              <a:t>4/3/2020</a:t>
+              <a:t>12/8/2020</a:t>
             </a:fld>
             <a:endParaRPr lang="en-US" dirty="0"/>
           </a:p>
@@ -11393,7 +11398,7 @@
             <a:fld id="{48A87A34-81AB-432B-8DAE-1953F412C126}" type="datetimeFigureOut">
               <a:rPr lang="en-US" smtClean="0"/>
               <a:pPr/>
-              <a:t>4/3/2020</a:t>
+              <a:t>12/8/2020</a:t>
             </a:fld>
             <a:endParaRPr lang="en-US" dirty="0"/>
           </a:p>
@@ -12159,7 +12164,7 @@
           <a:graphicData uri="http://schemas.openxmlformats.org/presentationml/2006/ole">
             <mc:AlternateContent xmlns:mc="http://schemas.openxmlformats.org/markup-compatibility/2006">
               <mc:Choice xmlns:v="urn:schemas-microsoft-com:vml" Requires="v">
-                <p:oleObj spid="_x0000_s5134" name="Equation" r:id="rId3" imgW="1168200" imgH="1117440" progId="Equation.3">
+                <p:oleObj spid="_x0000_s5140" name="Equation" r:id="rId3" imgW="1168200" imgH="1117440" progId="Equation.3">
                   <p:embed/>
                 </p:oleObj>
               </mc:Choice>
@@ -12226,7 +12231,7 @@
           <a:graphicData uri="http://schemas.openxmlformats.org/presentationml/2006/ole">
             <mc:AlternateContent xmlns:mc="http://schemas.openxmlformats.org/markup-compatibility/2006">
               <mc:Choice xmlns:v="urn:schemas-microsoft-com:vml" Requires="v">
-                <p:oleObj spid="_x0000_s5135" name="Equation" r:id="rId5" imgW="1638000" imgH="1041120" progId="Equation.3">
+                <p:oleObj spid="_x0000_s5141" name="Equation" r:id="rId5" imgW="1638000" imgH="1041120" progId="Equation.3">
                   <p:embed/>
                 </p:oleObj>
               </mc:Choice>
@@ -12302,7 +12307,7 @@
           <a:graphicData uri="http://schemas.openxmlformats.org/presentationml/2006/ole">
             <mc:AlternateContent xmlns:mc="http://schemas.openxmlformats.org/markup-compatibility/2006">
               <mc:Choice xmlns:v="urn:schemas-microsoft-com:vml" Requires="v">
-                <p:oleObj spid="_x0000_s5136" name="Equation" r:id="rId7" imgW="1866600" imgH="634680" progId="Equation.3">
+                <p:oleObj spid="_x0000_s5142" name="Equation" r:id="rId7" imgW="1866600" imgH="634680" progId="Equation.3">
                   <p:embed/>
                 </p:oleObj>
               </mc:Choice>
@@ -12562,7 +12567,7 @@
           <a:graphicData uri="http://schemas.openxmlformats.org/presentationml/2006/ole">
             <mc:AlternateContent xmlns:mc="http://schemas.openxmlformats.org/markup-compatibility/2006">
               <mc:Choice xmlns:v="urn:schemas-microsoft-com:vml" Requires="v">
-                <p:oleObj spid="_x0000_s6162" name="Equation" r:id="rId3" imgW="1333440" imgH="863280" progId="Equation.3">
+                <p:oleObj spid="_x0000_s6172" name="Equation" r:id="rId3" imgW="1333440" imgH="863280" progId="Equation.3">
                   <p:embed/>
                 </p:oleObj>
               </mc:Choice>
@@ -12632,7 +12637,7 @@
           <a:graphicData uri="http://schemas.openxmlformats.org/presentationml/2006/ole">
             <mc:AlternateContent xmlns:mc="http://schemas.openxmlformats.org/markup-compatibility/2006">
               <mc:Choice xmlns:v="urn:schemas-microsoft-com:vml" Requires="v">
-                <p:oleObj spid="_x0000_s6163" name="Equation" r:id="rId5" imgW="1079280" imgH="1091880" progId="Equation.3">
+                <p:oleObj spid="_x0000_s6173" name="Equation" r:id="rId5" imgW="1079280" imgH="1091880" progId="Equation.3">
                   <p:embed/>
                 </p:oleObj>
               </mc:Choice>
@@ -12699,7 +12704,7 @@
           <a:graphicData uri="http://schemas.openxmlformats.org/presentationml/2006/ole">
             <mc:AlternateContent xmlns:mc="http://schemas.openxmlformats.org/markup-compatibility/2006">
               <mc:Choice xmlns:v="urn:schemas-microsoft-com:vml" Requires="v">
-                <p:oleObj spid="_x0000_s6164" name="Equation" r:id="rId7" imgW="1028520" imgH="634680" progId="Equation.3">
+                <p:oleObj spid="_x0000_s6174" name="Equation" r:id="rId7" imgW="1028520" imgH="634680" progId="Equation.3">
                   <p:embed/>
                 </p:oleObj>
               </mc:Choice>
@@ -12775,7 +12780,7 @@
           <a:graphicData uri="http://schemas.openxmlformats.org/presentationml/2006/ole">
             <mc:AlternateContent xmlns:mc="http://schemas.openxmlformats.org/markup-compatibility/2006">
               <mc:Choice xmlns:v="urn:schemas-microsoft-com:vml" Requires="v">
-                <p:oleObj spid="_x0000_s6165" name="Equation" r:id="rId9" imgW="1384200" imgH="1218960" progId="Equation.3">
+                <p:oleObj spid="_x0000_s6175" name="Equation" r:id="rId9" imgW="1384200" imgH="1218960" progId="Equation.3">
                   <p:embed/>
                 </p:oleObj>
               </mc:Choice>
@@ -12842,7 +12847,7 @@
           <a:graphicData uri="http://schemas.openxmlformats.org/presentationml/2006/ole">
             <mc:AlternateContent xmlns:mc="http://schemas.openxmlformats.org/markup-compatibility/2006">
               <mc:Choice xmlns:v="urn:schemas-microsoft-com:vml" Requires="v">
-                <p:oleObj spid="_x0000_s6166" name="Equation" r:id="rId11" imgW="2019240" imgH="2286000" progId="Equation.3">
+                <p:oleObj spid="_x0000_s6176" name="Equation" r:id="rId11" imgW="2019240" imgH="2286000" progId="Equation.3">
                   <p:embed/>
                 </p:oleObj>
               </mc:Choice>
@@ -13073,7 +13078,7 @@
           <a:graphicData uri="http://schemas.openxmlformats.org/presentationml/2006/ole">
             <mc:AlternateContent xmlns:mc="http://schemas.openxmlformats.org/markup-compatibility/2006">
               <mc:Choice xmlns:v="urn:schemas-microsoft-com:vml" Requires="v">
-                <p:oleObj spid="_x0000_s8200" name="Equation" r:id="rId3" imgW="1117440" imgH="1218960" progId="Equation.3">
+                <p:oleObj spid="_x0000_s8204" name="Equation" r:id="rId3" imgW="1117440" imgH="1218960" progId="Equation.3">
                   <p:embed/>
                 </p:oleObj>
               </mc:Choice>
@@ -13143,7 +13148,7 @@
           <a:graphicData uri="http://schemas.openxmlformats.org/presentationml/2006/ole">
             <mc:AlternateContent xmlns:mc="http://schemas.openxmlformats.org/markup-compatibility/2006">
               <mc:Choice xmlns:v="urn:schemas-microsoft-com:vml" Requires="v">
-                <p:oleObj spid="_x0000_s8201" name="Equation" r:id="rId5" imgW="2286000" imgH="1828800" progId="Equation.3">
+                <p:oleObj spid="_x0000_s8205" name="Equation" r:id="rId5" imgW="2286000" imgH="1828800" progId="Equation.3">
                   <p:embed/>
                 </p:oleObj>
               </mc:Choice>
@@ -13724,7 +13729,7 @@
           <a:graphicData uri="http://schemas.openxmlformats.org/presentationml/2006/ole">
             <mc:AlternateContent xmlns:mc="http://schemas.openxmlformats.org/markup-compatibility/2006">
               <mc:Choice xmlns:v="urn:schemas-microsoft-com:vml" Requires="v">
-                <p:oleObj spid="_x0000_s9234" name="Equation" r:id="rId4" imgW="1307880" imgH="1981080" progId="Equation.3">
+                <p:oleObj spid="_x0000_s9242" name="Equation" r:id="rId4" imgW="1307880" imgH="1981080" progId="Equation.3">
                   <p:embed/>
                 </p:oleObj>
               </mc:Choice>
@@ -13794,7 +13799,7 @@
           <a:graphicData uri="http://schemas.openxmlformats.org/presentationml/2006/ole">
             <mc:AlternateContent xmlns:mc="http://schemas.openxmlformats.org/markup-compatibility/2006">
               <mc:Choice xmlns:v="urn:schemas-microsoft-com:vml" Requires="v">
-                <p:oleObj spid="_x0000_s9235" name="Equation" r:id="rId6" imgW="1434960" imgH="2158920" progId="Equation.3">
+                <p:oleObj spid="_x0000_s9243" name="Equation" r:id="rId6" imgW="1434960" imgH="2158920" progId="Equation.3">
                   <p:embed/>
                 </p:oleObj>
               </mc:Choice>
@@ -13864,7 +13869,7 @@
           <a:graphicData uri="http://schemas.openxmlformats.org/presentationml/2006/ole">
             <mc:AlternateContent xmlns:mc="http://schemas.openxmlformats.org/markup-compatibility/2006">
               <mc:Choice xmlns:v="urn:schemas-microsoft-com:vml" Requires="v">
-                <p:oleObj spid="_x0000_s9236" name="Equation" r:id="rId8" imgW="1104840" imgH="1002960" progId="Equation.3">
+                <p:oleObj spid="_x0000_s9244" name="Equation" r:id="rId8" imgW="1104840" imgH="1002960" progId="Equation.3">
                   <p:embed/>
                 </p:oleObj>
               </mc:Choice>
@@ -13940,7 +13945,7 @@
           <a:graphicData uri="http://schemas.openxmlformats.org/presentationml/2006/ole">
             <mc:AlternateContent xmlns:mc="http://schemas.openxmlformats.org/markup-compatibility/2006">
               <mc:Choice xmlns:v="urn:schemas-microsoft-com:vml" Requires="v">
-                <p:oleObj spid="_x0000_s9237" name="Equation" r:id="rId10" imgW="1295280" imgH="1002960" progId="Equation.3">
+                <p:oleObj spid="_x0000_s9245" name="Equation" r:id="rId10" imgW="1295280" imgH="1002960" progId="Equation.3">
                   <p:embed/>
                 </p:oleObj>
               </mc:Choice>
@@ -14681,17 +14686,23 @@
           <p:cNvGraphicFramePr>
             <a:graphicFrameLocks noChangeAspect="1"/>
           </p:cNvGraphicFramePr>
-          <p:nvPr/>
+          <p:nvPr>
+            <p:extLst>
+              <p:ext uri="{D42A27DB-BD31-4B8C-83A1-F6EECF244321}">
+                <p14:modId xmlns:p14="http://schemas.microsoft.com/office/powerpoint/2010/main" val="2294741541"/>
+              </p:ext>
+            </p:extLst>
+          </p:nvPr>
         </p:nvGraphicFramePr>
         <p:xfrm>
-          <a:off x="2895600" y="762000"/>
+          <a:off x="1905000" y="2194560"/>
           <a:ext cx="1981200" cy="2209800"/>
         </p:xfrm>
         <a:graphic>
           <a:graphicData uri="http://schemas.openxmlformats.org/presentationml/2006/ole">
             <mc:AlternateContent xmlns:mc="http://schemas.openxmlformats.org/markup-compatibility/2006">
               <mc:Choice xmlns:v="urn:schemas-microsoft-com:vml" Requires="v">
-                <p:oleObj spid="_x0000_s10244" name="Equation" r:id="rId3" imgW="1307880" imgH="1765080" progId="Equation.3">
+                <p:oleObj spid="_x0000_s10246" name="Equation" r:id="rId3" imgW="1307880" imgH="1765080" progId="Equation.3">
                   <p:embed/>
                 </p:oleObj>
               </mc:Choice>
@@ -14715,7 +14726,7 @@
                     </p:blipFill>
                     <p:spPr bwMode="auto">
                       <a:xfrm>
-                        <a:off x="2895600" y="762000"/>
+                        <a:off x="1905000" y="2194560"/>
                         <a:ext cx="1981200" cy="2209800"/>
                       </a:xfrm>
                       <a:prstGeom prst="rect">
@@ -14876,47 +14887,6 @@
           <a:chExt cx="0" cy="0"/>
         </a:xfrm>
       </p:grpSpPr>
-      <p:sp>
-        <p:nvSpPr>
-          <p:cNvPr id="2" name="Title 1"/>
-          <p:cNvSpPr>
-            <a:spLocks noGrp="1"/>
-          </p:cNvSpPr>
-          <p:nvPr>
-            <p:ph type="title"/>
-          </p:nvPr>
-        </p:nvSpPr>
-        <p:spPr/>
-        <p:txBody>
-          <a:bodyPr/>
-          <a:lstStyle/>
-          <a:p>
-            <a:endParaRPr lang="en-MY" dirty="0"/>
-          </a:p>
-        </p:txBody>
-      </p:sp>
-      <p:sp>
-        <p:nvSpPr>
-          <p:cNvPr id="3" name="Content Placeholder 2"/>
-          <p:cNvSpPr>
-            <a:spLocks noGrp="1"/>
-          </p:cNvSpPr>
-          <p:nvPr>
-            <p:ph idx="1"/>
-          </p:nvPr>
-        </p:nvSpPr>
-        <p:spPr/>
-        <p:txBody>
-          <a:bodyPr/>
-          <a:lstStyle/>
-          <a:p>
-            <a:pPr>
-              <a:buNone/>
-            </a:pPr>
-            <a:endParaRPr lang="en-MY" dirty="0"/>
-          </a:p>
-        </p:txBody>
-      </p:sp>
       <p:grpSp>
         <p:nvGrpSpPr>
           <p:cNvPr id="4" name="Group 3"/>
@@ -15643,19 +15613,23 @@
                   <a:srgbClr val="FF0000"/>
                 </a:solidFill>
               </a:rPr>
-              <a:t>(B)</a:t>
-            </a:r>
-            <a:r>
-              <a:rPr lang="en-US" altLang="en-US" b="1" dirty="0">
+              <a:t>(</a:t>
+            </a:r>
+            <a:r>
+              <a:rPr lang="en-US" altLang="en-US" b="1">
                 <a:solidFill>
-                  <a:srgbClr val="3333FF"/>
+                  <a:srgbClr val="FF0000"/>
                 </a:solidFill>
               </a:rPr>
-              <a:t>	</a:t>
+              <a:t>B)</a:t>
+            </a:r>
+            <a:r>
+              <a:rPr lang="en-US" altLang="en-US"/>
+              <a:t>: </a:t>
             </a:r>
             <a:r>
               <a:rPr lang="en-US" altLang="en-US" dirty="0"/>
-              <a:t>: The balance after down payment was made or the deposit.(Cash balance)</a:t>
+              <a:t>The balance after down payment was made or the deposit.(Cash balance)</a:t>
             </a:r>
           </a:p>
           <a:p>
@@ -15718,10 +15692,6 @@
                 <a:spcPct val="80000"/>
               </a:lnSpc>
             </a:pPr>
-            <a:r>
-              <a:rPr lang="en-US" altLang="en-US" dirty="0"/>
-              <a:t> </a:t>
-            </a:r>
             <a:r>
               <a:rPr lang="en-US" altLang="en-US" b="1" dirty="0">
                 <a:solidFill>
@@ -15827,7 +15797,7 @@
           <a:graphicData uri="http://schemas.openxmlformats.org/presentationml/2006/ole">
             <mc:AlternateContent xmlns:mc="http://schemas.openxmlformats.org/markup-compatibility/2006">
               <mc:Choice xmlns:v="urn:schemas-microsoft-com:vml" Requires="v">
-                <p:oleObj spid="_x0000_s1028" name="Equation" r:id="rId3" imgW="1015920" imgH="1714320" progId="Equation.3">
+                <p:oleObj spid="_x0000_s1030" name="Equation" r:id="rId3" imgW="1015920" imgH="1714320" progId="Equation.3">
                   <p:embed/>
                 </p:oleObj>
               </mc:Choice>
@@ -15975,7 +15945,7 @@
           <a:graphicData uri="http://schemas.openxmlformats.org/presentationml/2006/ole">
             <mc:AlternateContent xmlns:mc="http://schemas.openxmlformats.org/markup-compatibility/2006">
               <mc:Choice xmlns:v="urn:schemas-microsoft-com:vml" Requires="v">
-                <p:oleObj spid="_x0000_s2054" name="Equation" r:id="rId3" imgW="431640" imgH="177480" progId="Equation.3">
+                <p:oleObj spid="_x0000_s2058" name="Equation" r:id="rId3" imgW="431640" imgH="177480" progId="Equation.3">
                   <p:embed/>
                 </p:oleObj>
               </mc:Choice>
@@ -16045,7 +16015,7 @@
           <a:graphicData uri="http://schemas.openxmlformats.org/presentationml/2006/ole">
             <mc:AlternateContent xmlns:mc="http://schemas.openxmlformats.org/markup-compatibility/2006">
               <mc:Choice xmlns:v="urn:schemas-microsoft-com:vml" Requires="v">
-                <p:oleObj spid="_x0000_s2055" name="Equation" r:id="rId5" imgW="787320" imgH="393480" progId="Equation.3">
+                <p:oleObj spid="_x0000_s2059" name="Equation" r:id="rId5" imgW="787320" imgH="393480" progId="Equation.3">
                   <p:embed/>
                 </p:oleObj>
               </mc:Choice>
@@ -16420,7 +16390,7 @@
           <a:graphicData uri="http://schemas.openxmlformats.org/presentationml/2006/ole">
             <mc:AlternateContent xmlns:mc="http://schemas.openxmlformats.org/markup-compatibility/2006">
               <mc:Choice xmlns:v="urn:schemas-microsoft-com:vml" Requires="v">
-                <p:oleObj spid="_x0000_s3078" name="Equation" r:id="rId3" imgW="1371600" imgH="1346040" progId="Equation.3">
+                <p:oleObj spid="_x0000_s3082" name="Equation" r:id="rId3" imgW="1371600" imgH="1346040" progId="Equation.3">
                   <p:embed/>
                 </p:oleObj>
               </mc:Choice>
@@ -16487,7 +16457,7 @@
           <a:graphicData uri="http://schemas.openxmlformats.org/presentationml/2006/ole">
             <mc:AlternateContent xmlns:mc="http://schemas.openxmlformats.org/markup-compatibility/2006">
               <mc:Choice xmlns:v="urn:schemas-microsoft-com:vml" Requires="v">
-                <p:oleObj spid="_x0000_s3079" name="Equation" r:id="rId5" imgW="1841400" imgH="2006280" progId="Equation.3">
+                <p:oleObj spid="_x0000_s3083" name="Equation" r:id="rId5" imgW="1841400" imgH="2006280" progId="Equation.3">
                   <p:embed/>
                 </p:oleObj>
               </mc:Choice>
@@ -16634,7 +16604,7 @@
           <a:graphicData uri="http://schemas.openxmlformats.org/presentationml/2006/ole">
             <mc:AlternateContent xmlns:mc="http://schemas.openxmlformats.org/markup-compatibility/2006">
               <mc:Choice xmlns:v="urn:schemas-microsoft-com:vml" Requires="v">
-                <p:oleObj spid="_x0000_s4100" name="Equation" r:id="rId3" imgW="1473120" imgH="457200" progId="Equation.3">
+                <p:oleObj spid="_x0000_s4102" name="Equation" r:id="rId3" imgW="1473120" imgH="457200" progId="Equation.3">
                   <p:embed/>
                 </p:oleObj>
               </mc:Choice>

</xml_diff>